<commit_message>
Builder Csharp alteracao aula
</commit_message>
<xml_diff>
--- a/Aulas/Aula14_Builder/Aula14_DesignPattern_Criacional_1_Builder.pptx
+++ b/Aulas/Aula14_Builder/Aula14_DesignPattern_Criacional_1_Builder.pptx
@@ -5,7 +5,7 @@
     <p:sldMasterId id="2147483700" r:id="rId1"/>
   </p:sldMasterIdLst>
   <p:notesMasterIdLst>
-    <p:notesMasterId r:id="rId36"/>
+    <p:notesMasterId r:id="rId39"/>
   </p:notesMasterIdLst>
   <p:sldIdLst>
     <p:sldId id="256" r:id="rId2"/>
@@ -34,14 +34,17 @@
     <p:sldId id="311" r:id="rId25"/>
     <p:sldId id="312" r:id="rId26"/>
     <p:sldId id="313" r:id="rId27"/>
-    <p:sldId id="314" r:id="rId28"/>
-    <p:sldId id="315" r:id="rId29"/>
-    <p:sldId id="316" r:id="rId30"/>
-    <p:sldId id="298" r:id="rId31"/>
-    <p:sldId id="299" r:id="rId32"/>
-    <p:sldId id="317" r:id="rId33"/>
-    <p:sldId id="318" r:id="rId34"/>
-    <p:sldId id="319" r:id="rId35"/>
+    <p:sldId id="320" r:id="rId28"/>
+    <p:sldId id="314" r:id="rId29"/>
+    <p:sldId id="321" r:id="rId30"/>
+    <p:sldId id="322" r:id="rId31"/>
+    <p:sldId id="315" r:id="rId32"/>
+    <p:sldId id="316" r:id="rId33"/>
+    <p:sldId id="298" r:id="rId34"/>
+    <p:sldId id="299" r:id="rId35"/>
+    <p:sldId id="317" r:id="rId36"/>
+    <p:sldId id="318" r:id="rId37"/>
+    <p:sldId id="319" r:id="rId38"/>
   </p:sldIdLst>
   <p:sldSz cx="12192000" cy="6858000"/>
   <p:notesSz cx="6858000" cy="9144000"/>
@@ -152,7 +155,7 @@
 <p1510:revInfo xmlns:a="http://schemas.openxmlformats.org/drawingml/2006/main" xmlns:r="http://schemas.openxmlformats.org/officeDocument/2006/relationships" xmlns:p1510="http://schemas.microsoft.com/office/powerpoint/2015/10/main">
   <p1510:revLst>
     <p1510:client id="{7C602EA2-9F91-4277-9066-074CC36C71C3}" v="1" dt="2024-05-07T21:38:45.360"/>
-    <p1510:client id="{B70817A6-11F6-40EF-AC45-EF49FA594AFA}" v="60" dt="2024-05-08T20:10:02.770"/>
+    <p1510:client id="{B70817A6-11F6-40EF-AC45-EF49FA594AFA}" v="68" dt="2024-05-08T20:38:29.756"/>
   </p1510:revLst>
 </p1510:revInfo>
 </file>
@@ -162,7 +165,7 @@
   <pc:docChgLst>
     <pc:chgData name="Jefferson Passerini" userId="ec684a97d9b6a829" providerId="LiveId" clId="{B70817A6-11F6-40EF-AC45-EF49FA594AFA}"/>
     <pc:docChg chg="undo custSel addSld delSld modSld sldOrd">
-      <pc:chgData name="Jefferson Passerini" userId="ec684a97d9b6a829" providerId="LiveId" clId="{B70817A6-11F6-40EF-AC45-EF49FA594AFA}" dt="2024-05-08T20:17:07.204" v="7876" actId="20577"/>
+      <pc:chgData name="Jefferson Passerini" userId="ec684a97d9b6a829" providerId="LiveId" clId="{B70817A6-11F6-40EF-AC45-EF49FA594AFA}" dt="2024-05-08T20:39:15.636" v="7978" actId="122"/>
       <pc:docMkLst>
         <pc:docMk/>
       </pc:docMkLst>
@@ -1483,8 +1486,8 @@
           <pc:sldMk cId="1185081769" sldId="312"/>
         </pc:sldMkLst>
       </pc:sldChg>
-      <pc:sldChg chg="modSp add mod ord">
-        <pc:chgData name="Jefferson Passerini" userId="ec684a97d9b6a829" providerId="LiveId" clId="{B70817A6-11F6-40EF-AC45-EF49FA594AFA}" dt="2024-05-08T20:13:15.342" v="7734" actId="1076"/>
+      <pc:sldChg chg="addSp modSp add mod ord">
+        <pc:chgData name="Jefferson Passerini" userId="ec684a97d9b6a829" providerId="LiveId" clId="{B70817A6-11F6-40EF-AC45-EF49FA594AFA}" dt="2024-05-08T20:33:36.926" v="7899" actId="1076"/>
         <pc:sldMkLst>
           <pc:docMk/>
           <pc:sldMk cId="1902030872" sldId="313"/>
@@ -1498,13 +1501,29 @@
           </ac:spMkLst>
         </pc:spChg>
         <pc:spChg chg="mod">
-          <ac:chgData name="Jefferson Passerini" userId="ec684a97d9b6a829" providerId="LiveId" clId="{B70817A6-11F6-40EF-AC45-EF49FA594AFA}" dt="2024-05-08T19:57:42.041" v="7226" actId="113"/>
+          <ac:chgData name="Jefferson Passerini" userId="ec684a97d9b6a829" providerId="LiveId" clId="{B70817A6-11F6-40EF-AC45-EF49FA594AFA}" dt="2024-05-08T20:32:13.650" v="7884" actId="1076"/>
           <ac:spMkLst>
             <pc:docMk/>
             <pc:sldMk cId="1902030872" sldId="313"/>
             <ac:spMk id="3" creationId="{212081E4-07F6-C689-2ACC-B6CADD634983}"/>
           </ac:spMkLst>
         </pc:spChg>
+        <pc:spChg chg="add mod">
+          <ac:chgData name="Jefferson Passerini" userId="ec684a97d9b6a829" providerId="LiveId" clId="{B70817A6-11F6-40EF-AC45-EF49FA594AFA}" dt="2024-05-08T20:33:36.926" v="7899" actId="1076"/>
+          <ac:spMkLst>
+            <pc:docMk/>
+            <pc:sldMk cId="1902030872" sldId="313"/>
+            <ac:spMk id="7" creationId="{0E89D9CE-FC8E-6315-5410-3D98B2FB7405}"/>
+          </ac:spMkLst>
+        </pc:spChg>
+        <pc:picChg chg="add mod">
+          <ac:chgData name="Jefferson Passerini" userId="ec684a97d9b6a829" providerId="LiveId" clId="{B70817A6-11F6-40EF-AC45-EF49FA594AFA}" dt="2024-05-08T20:32:10.922" v="7883" actId="1076"/>
+          <ac:picMkLst>
+            <pc:docMk/>
+            <pc:sldMk cId="1902030872" sldId="313"/>
+            <ac:picMk id="6" creationId="{B6D2C957-AD4B-CD4D-66A3-2C08E2B51863}"/>
+          </ac:picMkLst>
+        </pc:picChg>
       </pc:sldChg>
       <pc:sldChg chg="del">
         <pc:chgData name="Jefferson Passerini" userId="ec684a97d9b6a829" providerId="LiveId" clId="{B70817A6-11F6-40EF-AC45-EF49FA594AFA}" dt="2024-05-08T16:14:47.983" v="219" actId="47"/>
@@ -1781,6 +1800,37 @@
           <pc:sldMk cId="3649811958" sldId="319"/>
         </pc:sldMkLst>
       </pc:sldChg>
+      <pc:sldChg chg="addSp modSp add mod">
+        <pc:chgData name="Jefferson Passerini" userId="ec684a97d9b6a829" providerId="LiveId" clId="{B70817A6-11F6-40EF-AC45-EF49FA594AFA}" dt="2024-05-08T20:33:31.575" v="7897" actId="14100"/>
+        <pc:sldMkLst>
+          <pc:docMk/>
+          <pc:sldMk cId="2830565104" sldId="320"/>
+        </pc:sldMkLst>
+        <pc:spChg chg="mod">
+          <ac:chgData name="Jefferson Passerini" userId="ec684a97d9b6a829" providerId="LiveId" clId="{B70817A6-11F6-40EF-AC45-EF49FA594AFA}" dt="2024-05-08T20:32:24.834" v="7890" actId="1076"/>
+          <ac:spMkLst>
+            <pc:docMk/>
+            <pc:sldMk cId="2830565104" sldId="320"/>
+            <ac:spMk id="3" creationId="{212081E4-07F6-C689-2ACC-B6CADD634983}"/>
+          </ac:spMkLst>
+        </pc:spChg>
+        <pc:spChg chg="add mod">
+          <ac:chgData name="Jefferson Passerini" userId="ec684a97d9b6a829" providerId="LiveId" clId="{B70817A6-11F6-40EF-AC45-EF49FA594AFA}" dt="2024-05-08T20:33:31.575" v="7897" actId="14100"/>
+          <ac:spMkLst>
+            <pc:docMk/>
+            <pc:sldMk cId="2830565104" sldId="320"/>
+            <ac:spMk id="6" creationId="{8351DC09-7E06-0641-C6AD-191DF58FEE6D}"/>
+          </ac:spMkLst>
+        </pc:spChg>
+        <pc:picChg chg="add mod">
+          <ac:chgData name="Jefferson Passerini" userId="ec684a97d9b6a829" providerId="LiveId" clId="{B70817A6-11F6-40EF-AC45-EF49FA594AFA}" dt="2024-05-08T20:32:28.922" v="7893" actId="1076"/>
+          <ac:picMkLst>
+            <pc:docMk/>
+            <pc:sldMk cId="2830565104" sldId="320"/>
+            <ac:picMk id="5" creationId="{E97866BE-8817-B3A2-454F-543FC6417ED8}"/>
+          </ac:picMkLst>
+        </pc:picChg>
+      </pc:sldChg>
       <pc:sldChg chg="del">
         <pc:chgData name="Jefferson Passerini" userId="ec684a97d9b6a829" providerId="LiveId" clId="{B70817A6-11F6-40EF-AC45-EF49FA594AFA}" dt="2024-05-08T16:14:46.372" v="215" actId="47"/>
         <pc:sldMkLst>
@@ -1795,12 +1845,106 @@
           <pc:sldMk cId="1908966349" sldId="321"/>
         </pc:sldMkLst>
       </pc:sldChg>
+      <pc:sldChg chg="addSp delSp modSp add mod">
+        <pc:chgData name="Jefferson Passerini" userId="ec684a97d9b6a829" providerId="LiveId" clId="{B70817A6-11F6-40EF-AC45-EF49FA594AFA}" dt="2024-05-08T20:34:50.139" v="7956" actId="20577"/>
+        <pc:sldMkLst>
+          <pc:docMk/>
+          <pc:sldMk cId="3732822316" sldId="321"/>
+        </pc:sldMkLst>
+        <pc:spChg chg="add mod">
+          <ac:chgData name="Jefferson Passerini" userId="ec684a97d9b6a829" providerId="LiveId" clId="{B70817A6-11F6-40EF-AC45-EF49FA594AFA}" dt="2024-05-08T20:34:28.259" v="7938" actId="20577"/>
+          <ac:spMkLst>
+            <pc:docMk/>
+            <pc:sldMk cId="3732822316" sldId="321"/>
+            <ac:spMk id="7" creationId="{AA1A203D-80AE-82CA-0952-411B87C07198}"/>
+          </ac:spMkLst>
+        </pc:spChg>
+        <pc:spChg chg="add mod">
+          <ac:chgData name="Jefferson Passerini" userId="ec684a97d9b6a829" providerId="LiveId" clId="{B70817A6-11F6-40EF-AC45-EF49FA594AFA}" dt="2024-05-08T20:34:50.139" v="7956" actId="20577"/>
+          <ac:spMkLst>
+            <pc:docMk/>
+            <pc:sldMk cId="3732822316" sldId="321"/>
+            <ac:spMk id="8" creationId="{D2FA29D8-10E7-0AB3-704A-680F273C3667}"/>
+          </ac:spMkLst>
+        </pc:spChg>
+        <pc:picChg chg="add mod">
+          <ac:chgData name="Jefferson Passerini" userId="ec684a97d9b6a829" providerId="LiveId" clId="{B70817A6-11F6-40EF-AC45-EF49FA594AFA}" dt="2024-05-08T20:34:13.845" v="7910" actId="1076"/>
+          <ac:picMkLst>
+            <pc:docMk/>
+            <pc:sldMk cId="3732822316" sldId="321"/>
+            <ac:picMk id="3" creationId="{C83DD5EB-9337-89D4-021C-3BABCBA14A44}"/>
+          </ac:picMkLst>
+        </pc:picChg>
+        <pc:picChg chg="add mod">
+          <ac:chgData name="Jefferson Passerini" userId="ec684a97d9b6a829" providerId="LiveId" clId="{B70817A6-11F6-40EF-AC45-EF49FA594AFA}" dt="2024-05-08T20:34:15.420" v="7911" actId="1076"/>
+          <ac:picMkLst>
+            <pc:docMk/>
+            <pc:sldMk cId="3732822316" sldId="321"/>
+            <ac:picMk id="5" creationId="{B72CD288-74A7-0C34-5290-4E9B03502B2A}"/>
+          </ac:picMkLst>
+        </pc:picChg>
+        <pc:picChg chg="del">
+          <ac:chgData name="Jefferson Passerini" userId="ec684a97d9b6a829" providerId="LiveId" clId="{B70817A6-11F6-40EF-AC45-EF49FA594AFA}" dt="2024-05-08T20:33:43.614" v="7901" actId="478"/>
+          <ac:picMkLst>
+            <pc:docMk/>
+            <pc:sldMk cId="3732822316" sldId="321"/>
+            <ac:picMk id="6" creationId="{DF1A88CA-C620-9F53-565E-E3EB050A9E34}"/>
+          </ac:picMkLst>
+        </pc:picChg>
+        <pc:picChg chg="del">
+          <ac:chgData name="Jefferson Passerini" userId="ec684a97d9b6a829" providerId="LiveId" clId="{B70817A6-11F6-40EF-AC45-EF49FA594AFA}" dt="2024-05-08T20:33:44.094" v="7902" actId="478"/>
+          <ac:picMkLst>
+            <pc:docMk/>
+            <pc:sldMk cId="3732822316" sldId="321"/>
+            <ac:picMk id="10" creationId="{D1141EB0-FCFA-06C1-058E-6961BAF6CA10}"/>
+          </ac:picMkLst>
+        </pc:picChg>
+        <pc:picChg chg="del">
+          <ac:chgData name="Jefferson Passerini" userId="ec684a97d9b6a829" providerId="LiveId" clId="{B70817A6-11F6-40EF-AC45-EF49FA594AFA}" dt="2024-05-08T20:33:44.742" v="7903" actId="478"/>
+          <ac:picMkLst>
+            <pc:docMk/>
+            <pc:sldMk cId="3732822316" sldId="321"/>
+            <ac:picMk id="12" creationId="{DC3DC4B2-B98E-B98B-B763-18E0D7969B89}"/>
+          </ac:picMkLst>
+        </pc:picChg>
+      </pc:sldChg>
       <pc:sldChg chg="del">
         <pc:chgData name="Jefferson Passerini" userId="ec684a97d9b6a829" providerId="LiveId" clId="{B70817A6-11F6-40EF-AC45-EF49FA594AFA}" dt="2024-05-08T16:14:47.201" v="217" actId="47"/>
         <pc:sldMkLst>
           <pc:docMk/>
           <pc:sldMk cId="1244849322" sldId="322"/>
         </pc:sldMkLst>
+      </pc:sldChg>
+      <pc:sldChg chg="addSp modSp add mod">
+        <pc:chgData name="Jefferson Passerini" userId="ec684a97d9b6a829" providerId="LiveId" clId="{B70817A6-11F6-40EF-AC45-EF49FA594AFA}" dt="2024-05-08T20:39:15.636" v="7978" actId="122"/>
+        <pc:sldMkLst>
+          <pc:docMk/>
+          <pc:sldMk cId="4100475490" sldId="322"/>
+        </pc:sldMkLst>
+        <pc:spChg chg="add mod">
+          <ac:chgData name="Jefferson Passerini" userId="ec684a97d9b6a829" providerId="LiveId" clId="{B70817A6-11F6-40EF-AC45-EF49FA594AFA}" dt="2024-05-08T20:38:36.358" v="7970" actId="20577"/>
+          <ac:spMkLst>
+            <pc:docMk/>
+            <pc:sldMk cId="4100475490" sldId="322"/>
+            <ac:spMk id="6" creationId="{F4B3FFE5-6B30-B0B2-CC8C-6B35E7A55EC2}"/>
+          </ac:spMkLst>
+        </pc:spChg>
+        <pc:spChg chg="mod">
+          <ac:chgData name="Jefferson Passerini" userId="ec684a97d9b6a829" providerId="LiveId" clId="{B70817A6-11F6-40EF-AC45-EF49FA594AFA}" dt="2024-05-08T20:39:15.636" v="7978" actId="122"/>
+          <ac:spMkLst>
+            <pc:docMk/>
+            <pc:sldMk cId="4100475490" sldId="322"/>
+            <ac:spMk id="7" creationId="{AA1A203D-80AE-82CA-0952-411B87C07198}"/>
+          </ac:spMkLst>
+        </pc:spChg>
+        <pc:spChg chg="mod">
+          <ac:chgData name="Jefferson Passerini" userId="ec684a97d9b6a829" providerId="LiveId" clId="{B70817A6-11F6-40EF-AC45-EF49FA594AFA}" dt="2024-05-08T20:38:28.647" v="7960" actId="1076"/>
+          <ac:spMkLst>
+            <pc:docMk/>
+            <pc:sldMk cId="4100475490" sldId="322"/>
+            <ac:spMk id="8" creationId="{D2FA29D8-10E7-0AB3-704A-680F273C3667}"/>
+          </ac:spMkLst>
+        </pc:spChg>
       </pc:sldChg>
       <pc:sldChg chg="del">
         <pc:chgData name="Jefferson Passerini" userId="ec684a97d9b6a829" providerId="LiveId" clId="{B70817A6-11F6-40EF-AC45-EF49FA594AFA}" dt="2024-05-08T16:15:00.639" v="248" actId="47"/>
@@ -26271,8 +26415,8 @@
         </p:nvSpPr>
         <p:spPr>
           <a:xfrm>
-            <a:off x="923131" y="809468"/>
-            <a:ext cx="11144250" cy="5927761"/>
+            <a:off x="187266" y="687493"/>
+            <a:ext cx="5172869" cy="5927761"/>
           </a:xfrm>
         </p:spPr>
         <p:txBody>
@@ -26312,44 +26456,6 @@
             <a:r>
               <a:rPr lang="pt-BR" sz="3200" dirty="0"/>
               <a:t> sugere a criação de um diretor.</a:t>
-            </a:r>
-          </a:p>
-          <a:p>
-            <a:pPr algn="l"/>
-            <a:endParaRPr lang="pt-BR" sz="3200" dirty="0"/>
-          </a:p>
-          <a:p>
-            <a:pPr algn="l"/>
-            <a:r>
-              <a:rPr lang="pt-BR" sz="3200" dirty="0"/>
-              <a:t>Trata-se de uma classe que controla quais métodos dos </a:t>
-            </a:r>
-            <a:r>
-              <a:rPr lang="pt-BR" sz="3200" dirty="0" err="1"/>
-              <a:t>Builders</a:t>
-            </a:r>
-            <a:r>
-              <a:rPr lang="pt-BR" sz="3200" dirty="0"/>
-              <a:t> serão chamados em cada contexto, e também em qual ordem tais métodos serão chamados</a:t>
-            </a:r>
-          </a:p>
-          <a:p>
-            <a:pPr algn="l"/>
-            <a:endParaRPr lang="pt-BR" sz="3200" dirty="0"/>
-          </a:p>
-          <a:p>
-            <a:pPr algn="l"/>
-            <a:r>
-              <a:rPr lang="pt-BR" sz="3200" dirty="0"/>
-              <a:t>Vamos criar a classe </a:t>
-            </a:r>
-            <a:r>
-              <a:rPr lang="pt-BR" sz="3200" b="1" dirty="0" err="1"/>
-              <a:t>GeradorPDFDirector</a:t>
-            </a:r>
-            <a:r>
-              <a:rPr lang="pt-BR" sz="3200" dirty="0"/>
-              <a:t>.</a:t>
             </a:r>
           </a:p>
           <a:p>
@@ -26488,6 +26594,88 @@
           </a:p>
         </p:txBody>
       </p:sp>
+      <p:pic>
+        <p:nvPicPr>
+          <p:cNvPr id="6" name="Imagem 5">
+            <a:extLst>
+              <a:ext uri="{FF2B5EF4-FFF2-40B4-BE49-F238E27FC236}">
+                <a16:creationId xmlns:a16="http://schemas.microsoft.com/office/drawing/2014/main" id="{B6D2C957-AD4B-CD4D-66A3-2C08E2B51863}"/>
+              </a:ext>
+            </a:extLst>
+          </p:cNvPr>
+          <p:cNvPicPr>
+            <a:picLocks noChangeAspect="1"/>
+          </p:cNvPicPr>
+          <p:nvPr/>
+        </p:nvPicPr>
+        <p:blipFill>
+          <a:blip r:embed="rId2"/>
+          <a:stretch>
+            <a:fillRect/>
+          </a:stretch>
+        </p:blipFill>
+        <p:spPr>
+          <a:xfrm>
+            <a:off x="5360135" y="1268850"/>
+            <a:ext cx="6630325" cy="4458322"/>
+          </a:xfrm>
+          <a:prstGeom prst="rect">
+            <a:avLst/>
+          </a:prstGeom>
+        </p:spPr>
+      </p:pic>
+      <p:sp>
+        <p:nvSpPr>
+          <p:cNvPr id="7" name="Retângulo 6">
+            <a:extLst>
+              <a:ext uri="{FF2B5EF4-FFF2-40B4-BE49-F238E27FC236}">
+                <a16:creationId xmlns:a16="http://schemas.microsoft.com/office/drawing/2014/main" id="{0E89D9CE-FC8E-6315-5410-3D98B2FB7405}"/>
+              </a:ext>
+            </a:extLst>
+          </p:cNvPr>
+          <p:cNvSpPr/>
+          <p:nvPr/>
+        </p:nvSpPr>
+        <p:spPr>
+          <a:xfrm>
+            <a:off x="9478616" y="1130828"/>
+            <a:ext cx="2526118" cy="1680989"/>
+          </a:xfrm>
+          <a:prstGeom prst="rect">
+            <a:avLst/>
+          </a:prstGeom>
+          <a:noFill/>
+          <a:ln w="57150">
+            <a:solidFill>
+              <a:srgbClr val="FF0000"/>
+            </a:solidFill>
+          </a:ln>
+        </p:spPr>
+        <p:style>
+          <a:lnRef idx="2">
+            <a:schemeClr val="accent1">
+              <a:shade val="15000"/>
+            </a:schemeClr>
+          </a:lnRef>
+          <a:fillRef idx="1">
+            <a:schemeClr val="accent1"/>
+          </a:fillRef>
+          <a:effectRef idx="0">
+            <a:schemeClr val="accent1"/>
+          </a:effectRef>
+          <a:fontRef idx="minor">
+            <a:schemeClr val="lt1"/>
+          </a:fontRef>
+        </p:style>
+        <p:txBody>
+          <a:bodyPr rtlCol="0" anchor="ctr"/>
+          <a:lstStyle/>
+          <a:p>
+            <a:pPr algn="ctr"/>
+            <a:endParaRPr lang="pt-BR"/>
+          </a:p>
+        </p:txBody>
+      </p:sp>
     </p:spTree>
     <p:extLst>
       <p:ext uri="{BB962C8B-B14F-4D97-AF65-F5344CB8AC3E}">
@@ -26502,6 +26690,315 @@
 </file>
 
 <file path=ppt/slides/slide27.xml><?xml version="1.0" encoding="utf-8"?>
+<p:sld xmlns:a="http://schemas.openxmlformats.org/drawingml/2006/main" xmlns:r="http://schemas.openxmlformats.org/officeDocument/2006/relationships" xmlns:p="http://schemas.openxmlformats.org/presentationml/2006/main">
+  <p:cSld>
+    <p:spTree>
+      <p:nvGrpSpPr>
+        <p:cNvPr id="1" name=""/>
+        <p:cNvGrpSpPr/>
+        <p:nvPr/>
+      </p:nvGrpSpPr>
+      <p:grpSpPr>
+        <a:xfrm>
+          <a:off x="0" y="0"/>
+          <a:ext cx="0" cy="0"/>
+          <a:chOff x="0" y="0"/>
+          <a:chExt cx="0" cy="0"/>
+        </a:xfrm>
+      </p:grpSpPr>
+      <p:sp>
+        <p:nvSpPr>
+          <p:cNvPr id="3" name="Espaço Reservado para Conteúdo 2">
+            <a:extLst>
+              <a:ext uri="{FF2B5EF4-FFF2-40B4-BE49-F238E27FC236}">
+                <a16:creationId xmlns:a16="http://schemas.microsoft.com/office/drawing/2014/main" id="{212081E4-07F6-C689-2ACC-B6CADD634983}"/>
+              </a:ext>
+            </a:extLst>
+          </p:cNvPr>
+          <p:cNvSpPr>
+            <a:spLocks noGrp="1"/>
+          </p:cNvSpPr>
+          <p:nvPr>
+            <p:ph idx="1"/>
+          </p:nvPr>
+        </p:nvSpPr>
+        <p:spPr>
+          <a:xfrm>
+            <a:off x="138127" y="677412"/>
+            <a:ext cx="5046348" cy="5927761"/>
+          </a:xfrm>
+        </p:spPr>
+        <p:txBody>
+          <a:bodyPr>
+            <a:normAutofit/>
+          </a:bodyPr>
+          <a:lstStyle/>
+          <a:p>
+            <a:pPr algn="l"/>
+            <a:r>
+              <a:rPr lang="pt-BR" sz="3200" dirty="0"/>
+              <a:t>Trata-se de uma classe que controla quais métodos dos </a:t>
+            </a:r>
+            <a:r>
+              <a:rPr lang="pt-BR" sz="3200" dirty="0" err="1"/>
+              <a:t>Builders</a:t>
+            </a:r>
+            <a:r>
+              <a:rPr lang="pt-BR" sz="3200" dirty="0"/>
+              <a:t> serão chamados em cada contexto, e também em qual ordem tais métodos serão chamados</a:t>
+            </a:r>
+          </a:p>
+          <a:p>
+            <a:pPr algn="l"/>
+            <a:endParaRPr lang="pt-BR" sz="3200" dirty="0"/>
+          </a:p>
+          <a:p>
+            <a:pPr algn="l"/>
+            <a:r>
+              <a:rPr lang="pt-BR" sz="3200" dirty="0"/>
+              <a:t>Vamos criar a classe </a:t>
+            </a:r>
+            <a:r>
+              <a:rPr lang="pt-BR" sz="3200" b="1" dirty="0" err="1"/>
+              <a:t>GeradorPDFDirector</a:t>
+            </a:r>
+            <a:r>
+              <a:rPr lang="pt-BR" sz="3200" dirty="0"/>
+              <a:t>.</a:t>
+            </a:r>
+          </a:p>
+          <a:p>
+            <a:pPr algn="l"/>
+            <a:endParaRPr lang="pt-BR" sz="3200" dirty="0"/>
+          </a:p>
+        </p:txBody>
+      </p:sp>
+      <p:sp>
+        <p:nvSpPr>
+          <p:cNvPr id="4" name="Título 3">
+            <a:extLst>
+              <a:ext uri="{FF2B5EF4-FFF2-40B4-BE49-F238E27FC236}">
+                <a16:creationId xmlns:a16="http://schemas.microsoft.com/office/drawing/2014/main" id="{5EA05B02-D80D-3624-D3E0-6EB75542A97B}"/>
+              </a:ext>
+            </a:extLst>
+          </p:cNvPr>
+          <p:cNvSpPr txBox="1">
+            <a:spLocks/>
+          </p:cNvSpPr>
+          <p:nvPr/>
+        </p:nvSpPr>
+        <p:spPr>
+          <a:xfrm>
+            <a:off x="923131" y="242746"/>
+            <a:ext cx="11144250" cy="379413"/>
+          </a:xfrm>
+          <a:prstGeom prst="rect">
+            <a:avLst/>
+          </a:prstGeom>
+          <a:solidFill>
+            <a:srgbClr val="000000"/>
+          </a:solidFill>
+        </p:spPr>
+        <p:txBody>
+          <a:bodyPr vert="horz" lIns="91440" tIns="45720" rIns="91440" bIns="45720" rtlCol="0" anchor="ctr">
+            <a:normAutofit/>
+          </a:bodyPr>
+          <a:lstStyle>
+            <a:lvl1pPr algn="l" defTabSz="914400" rtl="0" eaLnBrk="1" latinLnBrk="0" hangingPunct="1">
+              <a:lnSpc>
+                <a:spcPct val="90000"/>
+              </a:lnSpc>
+              <a:spcBef>
+                <a:spcPct val="0"/>
+              </a:spcBef>
+              <a:buNone/>
+              <a:defRPr sz="4400" kern="1200">
+                <a:solidFill>
+                  <a:schemeClr val="tx1"/>
+                </a:solidFill>
+                <a:latin typeface="+mj-lt"/>
+                <a:ea typeface="+mj-ea"/>
+                <a:cs typeface="+mj-cs"/>
+              </a:defRPr>
+            </a:lvl1pPr>
+          </a:lstStyle>
+          <a:p>
+            <a:pPr algn="r"/>
+            <a:r>
+              <a:rPr lang="pt-BR" sz="1935" b="1" dirty="0">
+                <a:solidFill>
+                  <a:schemeClr val="bg1"/>
+                </a:solidFill>
+              </a:rPr>
+              <a:t>Padrões de Projetos </a:t>
+            </a:r>
+            <a:r>
+              <a:rPr lang="pt-BR" sz="1935" b="1" dirty="0" err="1">
+                <a:solidFill>
+                  <a:schemeClr val="bg1"/>
+                </a:solidFill>
+              </a:rPr>
+              <a:t>Criacional</a:t>
+            </a:r>
+            <a:r>
+              <a:rPr lang="pt-BR" sz="1935" b="1" dirty="0">
+                <a:solidFill>
+                  <a:schemeClr val="bg1"/>
+                </a:solidFill>
+              </a:rPr>
+              <a:t> – </a:t>
+            </a:r>
+            <a:r>
+              <a:rPr lang="pt-BR" sz="1935" b="1" dirty="0" err="1">
+                <a:solidFill>
+                  <a:schemeClr val="bg1"/>
+                </a:solidFill>
+              </a:rPr>
+              <a:t>Builder</a:t>
+            </a:r>
+            <a:endParaRPr lang="pt-BR" sz="1935" b="1" dirty="0">
+              <a:solidFill>
+                <a:schemeClr val="bg1"/>
+              </a:solidFill>
+            </a:endParaRPr>
+          </a:p>
+        </p:txBody>
+      </p:sp>
+      <p:sp>
+        <p:nvSpPr>
+          <p:cNvPr id="2" name="CaixaDeTexto 1">
+            <a:extLst>
+              <a:ext uri="{FF2B5EF4-FFF2-40B4-BE49-F238E27FC236}">
+                <a16:creationId xmlns:a16="http://schemas.microsoft.com/office/drawing/2014/main" id="{833D04CD-11B8-55DE-B219-63E10E011332}"/>
+              </a:ext>
+            </a:extLst>
+          </p:cNvPr>
+          <p:cNvSpPr txBox="1"/>
+          <p:nvPr/>
+        </p:nvSpPr>
+        <p:spPr>
+          <a:xfrm>
+            <a:off x="923131" y="252827"/>
+            <a:ext cx="4909714" cy="369332"/>
+          </a:xfrm>
+          <a:prstGeom prst="rect">
+            <a:avLst/>
+          </a:prstGeom>
+          <a:noFill/>
+        </p:spPr>
+        <p:txBody>
+          <a:bodyPr wrap="square" rtlCol="0">
+            <a:spAutoFit/>
+          </a:bodyPr>
+          <a:lstStyle/>
+          <a:p>
+            <a:r>
+              <a:rPr lang="pt-BR" b="1" dirty="0">
+                <a:solidFill>
+                  <a:schemeClr val="bg1"/>
+                </a:solidFill>
+              </a:rPr>
+              <a:t>Implementação C# - Solução </a:t>
+            </a:r>
+          </a:p>
+        </p:txBody>
+      </p:sp>
+      <p:pic>
+        <p:nvPicPr>
+          <p:cNvPr id="5" name="Imagem 4">
+            <a:extLst>
+              <a:ext uri="{FF2B5EF4-FFF2-40B4-BE49-F238E27FC236}">
+                <a16:creationId xmlns:a16="http://schemas.microsoft.com/office/drawing/2014/main" id="{E97866BE-8817-B3A2-454F-543FC6417ED8}"/>
+              </a:ext>
+            </a:extLst>
+          </p:cNvPr>
+          <p:cNvPicPr>
+            <a:picLocks noChangeAspect="1"/>
+          </p:cNvPicPr>
+          <p:nvPr/>
+        </p:nvPicPr>
+        <p:blipFill>
+          <a:blip r:embed="rId2"/>
+          <a:stretch>
+            <a:fillRect/>
+          </a:stretch>
+        </p:blipFill>
+        <p:spPr>
+          <a:xfrm>
+            <a:off x="5296619" y="1199839"/>
+            <a:ext cx="6630325" cy="4458322"/>
+          </a:xfrm>
+          <a:prstGeom prst="rect">
+            <a:avLst/>
+          </a:prstGeom>
+        </p:spPr>
+      </p:pic>
+      <p:sp>
+        <p:nvSpPr>
+          <p:cNvPr id="6" name="Retângulo 5">
+            <a:extLst>
+              <a:ext uri="{FF2B5EF4-FFF2-40B4-BE49-F238E27FC236}">
+                <a16:creationId xmlns:a16="http://schemas.microsoft.com/office/drawing/2014/main" id="{8351DC09-7E06-0641-C6AD-191DF58FEE6D}"/>
+              </a:ext>
+            </a:extLst>
+          </p:cNvPr>
+          <p:cNvSpPr/>
+          <p:nvPr/>
+        </p:nvSpPr>
+        <p:spPr>
+          <a:xfrm>
+            <a:off x="9400826" y="1079463"/>
+            <a:ext cx="2526118" cy="1680989"/>
+          </a:xfrm>
+          <a:prstGeom prst="rect">
+            <a:avLst/>
+          </a:prstGeom>
+          <a:noFill/>
+          <a:ln w="57150">
+            <a:solidFill>
+              <a:srgbClr val="FF0000"/>
+            </a:solidFill>
+          </a:ln>
+        </p:spPr>
+        <p:style>
+          <a:lnRef idx="2">
+            <a:schemeClr val="accent1">
+              <a:shade val="15000"/>
+            </a:schemeClr>
+          </a:lnRef>
+          <a:fillRef idx="1">
+            <a:schemeClr val="accent1"/>
+          </a:fillRef>
+          <a:effectRef idx="0">
+            <a:schemeClr val="accent1"/>
+          </a:effectRef>
+          <a:fontRef idx="minor">
+            <a:schemeClr val="lt1"/>
+          </a:fontRef>
+        </p:style>
+        <p:txBody>
+          <a:bodyPr rtlCol="0" anchor="ctr"/>
+          <a:lstStyle/>
+          <a:p>
+            <a:pPr algn="ctr"/>
+            <a:endParaRPr lang="pt-BR"/>
+          </a:p>
+        </p:txBody>
+      </p:sp>
+    </p:spTree>
+    <p:extLst>
+      <p:ext uri="{BB962C8B-B14F-4D97-AF65-F5344CB8AC3E}">
+        <p14:creationId xmlns:p14="http://schemas.microsoft.com/office/powerpoint/2010/main" val="2830565104"/>
+      </p:ext>
+    </p:extLst>
+  </p:cSld>
+  <p:clrMapOvr>
+    <a:masterClrMapping/>
+  </p:clrMapOvr>
+</p:sld>
+</file>
+
+<file path=ppt/slides/slide28.xml><?xml version="1.0" encoding="utf-8"?>
 <p:sld xmlns:a="http://schemas.openxmlformats.org/drawingml/2006/main" xmlns:r="http://schemas.openxmlformats.org/officeDocument/2006/relationships" xmlns:p="http://schemas.openxmlformats.org/presentationml/2006/main">
   <p:cSld>
     <p:spTree>
@@ -26751,7 +27248,842 @@
 </p:sld>
 </file>
 
-<file path=ppt/slides/slide28.xml><?xml version="1.0" encoding="utf-8"?>
+<file path=ppt/slides/slide29.xml><?xml version="1.0" encoding="utf-8"?>
+<p:sld xmlns:a="http://schemas.openxmlformats.org/drawingml/2006/main" xmlns:r="http://schemas.openxmlformats.org/officeDocument/2006/relationships" xmlns:p="http://schemas.openxmlformats.org/presentationml/2006/main">
+  <p:cSld>
+    <p:spTree>
+      <p:nvGrpSpPr>
+        <p:cNvPr id="1" name=""/>
+        <p:cNvGrpSpPr/>
+        <p:nvPr/>
+      </p:nvGrpSpPr>
+      <p:grpSpPr>
+        <a:xfrm>
+          <a:off x="0" y="0"/>
+          <a:ext cx="0" cy="0"/>
+          <a:chOff x="0" y="0"/>
+          <a:chExt cx="0" cy="0"/>
+        </a:xfrm>
+      </p:grpSpPr>
+      <p:sp>
+        <p:nvSpPr>
+          <p:cNvPr id="4" name="Título 3">
+            <a:extLst>
+              <a:ext uri="{FF2B5EF4-FFF2-40B4-BE49-F238E27FC236}">
+                <a16:creationId xmlns:a16="http://schemas.microsoft.com/office/drawing/2014/main" id="{5EA05B02-D80D-3624-D3E0-6EB75542A97B}"/>
+              </a:ext>
+            </a:extLst>
+          </p:cNvPr>
+          <p:cNvSpPr txBox="1">
+            <a:spLocks/>
+          </p:cNvSpPr>
+          <p:nvPr/>
+        </p:nvSpPr>
+        <p:spPr>
+          <a:xfrm>
+            <a:off x="923131" y="242746"/>
+            <a:ext cx="11144250" cy="379413"/>
+          </a:xfrm>
+          <a:prstGeom prst="rect">
+            <a:avLst/>
+          </a:prstGeom>
+          <a:solidFill>
+            <a:srgbClr val="000000"/>
+          </a:solidFill>
+        </p:spPr>
+        <p:txBody>
+          <a:bodyPr vert="horz" lIns="91440" tIns="45720" rIns="91440" bIns="45720" rtlCol="0" anchor="ctr">
+            <a:normAutofit/>
+          </a:bodyPr>
+          <a:lstStyle>
+            <a:lvl1pPr algn="l" defTabSz="914400" rtl="0" eaLnBrk="1" latinLnBrk="0" hangingPunct="1">
+              <a:lnSpc>
+                <a:spcPct val="90000"/>
+              </a:lnSpc>
+              <a:spcBef>
+                <a:spcPct val="0"/>
+              </a:spcBef>
+              <a:buNone/>
+              <a:defRPr sz="4400" kern="1200">
+                <a:solidFill>
+                  <a:schemeClr val="tx1"/>
+                </a:solidFill>
+                <a:latin typeface="+mj-lt"/>
+                <a:ea typeface="+mj-ea"/>
+                <a:cs typeface="+mj-cs"/>
+              </a:defRPr>
+            </a:lvl1pPr>
+          </a:lstStyle>
+          <a:p>
+            <a:pPr algn="r"/>
+            <a:r>
+              <a:rPr lang="pt-BR" sz="1935" b="1" dirty="0">
+                <a:solidFill>
+                  <a:schemeClr val="bg1"/>
+                </a:solidFill>
+              </a:rPr>
+              <a:t>Padrões de Projetos </a:t>
+            </a:r>
+            <a:r>
+              <a:rPr lang="pt-BR" sz="1935" b="1" dirty="0" err="1">
+                <a:solidFill>
+                  <a:schemeClr val="bg1"/>
+                </a:solidFill>
+              </a:rPr>
+              <a:t>Criacional</a:t>
+            </a:r>
+            <a:r>
+              <a:rPr lang="pt-BR" sz="1935" b="1" dirty="0">
+                <a:solidFill>
+                  <a:schemeClr val="bg1"/>
+                </a:solidFill>
+              </a:rPr>
+              <a:t> – </a:t>
+            </a:r>
+            <a:r>
+              <a:rPr lang="pt-BR" sz="1935" b="1" dirty="0" err="1">
+                <a:solidFill>
+                  <a:schemeClr val="bg1"/>
+                </a:solidFill>
+              </a:rPr>
+              <a:t>Builder</a:t>
+            </a:r>
+            <a:endParaRPr lang="pt-BR" sz="1935" b="1" dirty="0">
+              <a:solidFill>
+                <a:schemeClr val="bg1"/>
+              </a:solidFill>
+            </a:endParaRPr>
+          </a:p>
+        </p:txBody>
+      </p:sp>
+      <p:sp>
+        <p:nvSpPr>
+          <p:cNvPr id="2" name="CaixaDeTexto 1">
+            <a:extLst>
+              <a:ext uri="{FF2B5EF4-FFF2-40B4-BE49-F238E27FC236}">
+                <a16:creationId xmlns:a16="http://schemas.microsoft.com/office/drawing/2014/main" id="{833D04CD-11B8-55DE-B219-63E10E011332}"/>
+              </a:ext>
+            </a:extLst>
+          </p:cNvPr>
+          <p:cNvSpPr txBox="1"/>
+          <p:nvPr/>
+        </p:nvSpPr>
+        <p:spPr>
+          <a:xfrm>
+            <a:off x="923131" y="232627"/>
+            <a:ext cx="4909714" cy="369332"/>
+          </a:xfrm>
+          <a:prstGeom prst="rect">
+            <a:avLst/>
+          </a:prstGeom>
+          <a:noFill/>
+        </p:spPr>
+        <p:txBody>
+          <a:bodyPr wrap="square" rtlCol="0">
+            <a:spAutoFit/>
+          </a:bodyPr>
+          <a:lstStyle/>
+          <a:p>
+            <a:r>
+              <a:rPr lang="pt-BR" b="1" dirty="0">
+                <a:solidFill>
+                  <a:schemeClr val="bg1"/>
+                </a:solidFill>
+              </a:rPr>
+              <a:t>Implementação C# - Solução </a:t>
+            </a:r>
+          </a:p>
+        </p:txBody>
+      </p:sp>
+      <p:pic>
+        <p:nvPicPr>
+          <p:cNvPr id="3" name="Imagem 2">
+            <a:extLst>
+              <a:ext uri="{FF2B5EF4-FFF2-40B4-BE49-F238E27FC236}">
+                <a16:creationId xmlns:a16="http://schemas.microsoft.com/office/drawing/2014/main" id="{C83DD5EB-9337-89D4-021C-3BABCBA14A44}"/>
+              </a:ext>
+            </a:extLst>
+          </p:cNvPr>
+          <p:cNvPicPr>
+            <a:picLocks noChangeAspect="1"/>
+          </p:cNvPicPr>
+          <p:nvPr/>
+        </p:nvPicPr>
+        <p:blipFill>
+          <a:blip r:embed="rId2"/>
+          <a:stretch>
+            <a:fillRect/>
+          </a:stretch>
+        </p:blipFill>
+        <p:spPr>
+          <a:xfrm>
+            <a:off x="6010765" y="1233181"/>
+            <a:ext cx="6056616" cy="4072552"/>
+          </a:xfrm>
+          <a:prstGeom prst="rect">
+            <a:avLst/>
+          </a:prstGeom>
+        </p:spPr>
+      </p:pic>
+      <p:pic>
+        <p:nvPicPr>
+          <p:cNvPr id="5" name="Imagem 4">
+            <a:extLst>
+              <a:ext uri="{FF2B5EF4-FFF2-40B4-BE49-F238E27FC236}">
+                <a16:creationId xmlns:a16="http://schemas.microsoft.com/office/drawing/2014/main" id="{B72CD288-74A7-0C34-5290-4E9B03502B2A}"/>
+              </a:ext>
+            </a:extLst>
+          </p:cNvPr>
+          <p:cNvPicPr>
+            <a:picLocks noChangeAspect="1"/>
+          </p:cNvPicPr>
+          <p:nvPr/>
+        </p:nvPicPr>
+        <p:blipFill>
+          <a:blip r:embed="rId3"/>
+          <a:stretch>
+            <a:fillRect/>
+          </a:stretch>
+        </p:blipFill>
+        <p:spPr>
+          <a:xfrm>
+            <a:off x="422479" y="1233181"/>
+            <a:ext cx="5324743" cy="3805747"/>
+          </a:xfrm>
+          <a:prstGeom prst="rect">
+            <a:avLst/>
+          </a:prstGeom>
+        </p:spPr>
+      </p:pic>
+      <p:sp>
+        <p:nvSpPr>
+          <p:cNvPr id="7" name="CaixaDeTexto 6">
+            <a:extLst>
+              <a:ext uri="{FF2B5EF4-FFF2-40B4-BE49-F238E27FC236}">
+                <a16:creationId xmlns:a16="http://schemas.microsoft.com/office/drawing/2014/main" id="{AA1A203D-80AE-82CA-0952-411B87C07198}"/>
+              </a:ext>
+            </a:extLst>
+          </p:cNvPr>
+          <p:cNvSpPr txBox="1"/>
+          <p:nvPr/>
+        </p:nvSpPr>
+        <p:spPr>
+          <a:xfrm>
+            <a:off x="1215957" y="5398851"/>
+            <a:ext cx="2957209" cy="369332"/>
+          </a:xfrm>
+          <a:prstGeom prst="rect">
+            <a:avLst/>
+          </a:prstGeom>
+          <a:noFill/>
+        </p:spPr>
+        <p:txBody>
+          <a:bodyPr wrap="square" rtlCol="0">
+            <a:spAutoFit/>
+          </a:bodyPr>
+          <a:lstStyle/>
+          <a:p>
+            <a:r>
+              <a:rPr lang="pt-BR" dirty="0"/>
+              <a:t>Modelo Genérico do </a:t>
+            </a:r>
+            <a:r>
+              <a:rPr lang="pt-BR" dirty="0" err="1"/>
+              <a:t>Builder</a:t>
+            </a:r>
+            <a:endParaRPr lang="pt-BR" dirty="0"/>
+          </a:p>
+        </p:txBody>
+      </p:sp>
+      <p:sp>
+        <p:nvSpPr>
+          <p:cNvPr id="8" name="CaixaDeTexto 7">
+            <a:extLst>
+              <a:ext uri="{FF2B5EF4-FFF2-40B4-BE49-F238E27FC236}">
+                <a16:creationId xmlns:a16="http://schemas.microsoft.com/office/drawing/2014/main" id="{D2FA29D8-10E7-0AB3-704A-680F273C3667}"/>
+              </a:ext>
+            </a:extLst>
+          </p:cNvPr>
+          <p:cNvSpPr txBox="1"/>
+          <p:nvPr/>
+        </p:nvSpPr>
+        <p:spPr>
+          <a:xfrm>
+            <a:off x="7467600" y="5440153"/>
+            <a:ext cx="2957209" cy="369332"/>
+          </a:xfrm>
+          <a:prstGeom prst="rect">
+            <a:avLst/>
+          </a:prstGeom>
+          <a:noFill/>
+        </p:spPr>
+        <p:txBody>
+          <a:bodyPr wrap="square" rtlCol="0">
+            <a:spAutoFit/>
+          </a:bodyPr>
+          <a:lstStyle/>
+          <a:p>
+            <a:r>
+              <a:rPr lang="pt-BR" dirty="0"/>
+              <a:t>Modelo Aplicado do </a:t>
+            </a:r>
+            <a:r>
+              <a:rPr lang="pt-BR" dirty="0" err="1"/>
+              <a:t>Builder</a:t>
+            </a:r>
+            <a:endParaRPr lang="pt-BR" dirty="0"/>
+          </a:p>
+        </p:txBody>
+      </p:sp>
+    </p:spTree>
+    <p:extLst>
+      <p:ext uri="{BB962C8B-B14F-4D97-AF65-F5344CB8AC3E}">
+        <p14:creationId xmlns:p14="http://schemas.microsoft.com/office/powerpoint/2010/main" val="3732822316"/>
+      </p:ext>
+    </p:extLst>
+  </p:cSld>
+  <p:clrMapOvr>
+    <a:masterClrMapping/>
+  </p:clrMapOvr>
+</p:sld>
+</file>
+
+<file path=ppt/slides/slide3.xml><?xml version="1.0" encoding="utf-8"?>
+<p:sld xmlns:a="http://schemas.openxmlformats.org/drawingml/2006/main" xmlns:r="http://schemas.openxmlformats.org/officeDocument/2006/relationships" xmlns:p="http://schemas.openxmlformats.org/presentationml/2006/main">
+  <p:cSld>
+    <p:spTree>
+      <p:nvGrpSpPr>
+        <p:cNvPr id="1" name=""/>
+        <p:cNvGrpSpPr/>
+        <p:nvPr/>
+      </p:nvGrpSpPr>
+      <p:grpSpPr>
+        <a:xfrm>
+          <a:off x="0" y="0"/>
+          <a:ext cx="0" cy="0"/>
+          <a:chOff x="0" y="0"/>
+          <a:chExt cx="0" cy="0"/>
+        </a:xfrm>
+      </p:grpSpPr>
+      <p:sp>
+        <p:nvSpPr>
+          <p:cNvPr id="3" name="Espaço Reservado para Conteúdo 2">
+            <a:extLst>
+              <a:ext uri="{FF2B5EF4-FFF2-40B4-BE49-F238E27FC236}">
+                <a16:creationId xmlns:a16="http://schemas.microsoft.com/office/drawing/2014/main" id="{212081E4-07F6-C689-2ACC-B6CADD634983}"/>
+              </a:ext>
+            </a:extLst>
+          </p:cNvPr>
+          <p:cNvSpPr>
+            <a:spLocks noGrp="1"/>
+          </p:cNvSpPr>
+          <p:nvPr>
+            <p:ph idx="1"/>
+          </p:nvPr>
+        </p:nvSpPr>
+        <p:spPr>
+          <a:xfrm>
+            <a:off x="838199" y="809469"/>
+            <a:ext cx="11229181" cy="5367494"/>
+          </a:xfrm>
+        </p:spPr>
+        <p:txBody>
+          <a:bodyPr>
+            <a:normAutofit/>
+          </a:bodyPr>
+          <a:lstStyle/>
+          <a:p>
+            <a:pPr marL="0" indent="0" algn="ctr">
+              <a:buNone/>
+            </a:pPr>
+            <a:r>
+              <a:rPr lang="pt-BR" b="1" dirty="0"/>
+              <a:t>Aplicabilidade (Quando utilizar?)</a:t>
+            </a:r>
+          </a:p>
+          <a:p>
+            <a:pPr algn="l"/>
+            <a:r>
+              <a:rPr lang="pt-BR" sz="3200" dirty="0"/>
+              <a:t>Quando um algoritmo que cria um objeto complexo deve ser independente das partes que o compõem e de como tais partes são montadas.</a:t>
+            </a:r>
+          </a:p>
+          <a:p>
+            <a:pPr algn="l"/>
+            <a:endParaRPr lang="pt-BR" sz="3200" dirty="0"/>
+          </a:p>
+          <a:p>
+            <a:pPr algn="l"/>
+            <a:r>
+              <a:rPr lang="pt-BR" sz="3200" dirty="0"/>
+              <a:t>Quando o processo de construção deve permitir representações diferentes para o objeto que é construído.</a:t>
+            </a:r>
+          </a:p>
+        </p:txBody>
+      </p:sp>
+      <p:sp>
+        <p:nvSpPr>
+          <p:cNvPr id="4" name="Título 3">
+            <a:extLst>
+              <a:ext uri="{FF2B5EF4-FFF2-40B4-BE49-F238E27FC236}">
+                <a16:creationId xmlns:a16="http://schemas.microsoft.com/office/drawing/2014/main" id="{5EA05B02-D80D-3624-D3E0-6EB75542A97B}"/>
+              </a:ext>
+            </a:extLst>
+          </p:cNvPr>
+          <p:cNvSpPr txBox="1">
+            <a:spLocks/>
+          </p:cNvSpPr>
+          <p:nvPr/>
+        </p:nvSpPr>
+        <p:spPr>
+          <a:xfrm>
+            <a:off x="923131" y="242746"/>
+            <a:ext cx="11144250" cy="379413"/>
+          </a:xfrm>
+          <a:prstGeom prst="rect">
+            <a:avLst/>
+          </a:prstGeom>
+          <a:solidFill>
+            <a:srgbClr val="000000"/>
+          </a:solidFill>
+        </p:spPr>
+        <p:txBody>
+          <a:bodyPr vert="horz" lIns="91440" tIns="45720" rIns="91440" bIns="45720" rtlCol="0" anchor="ctr">
+            <a:normAutofit/>
+          </a:bodyPr>
+          <a:lstStyle>
+            <a:lvl1pPr algn="l" defTabSz="914400" rtl="0" eaLnBrk="1" latinLnBrk="0" hangingPunct="1">
+              <a:lnSpc>
+                <a:spcPct val="90000"/>
+              </a:lnSpc>
+              <a:spcBef>
+                <a:spcPct val="0"/>
+              </a:spcBef>
+              <a:buNone/>
+              <a:defRPr sz="4400" kern="1200">
+                <a:solidFill>
+                  <a:schemeClr val="tx1"/>
+                </a:solidFill>
+                <a:latin typeface="+mj-lt"/>
+                <a:ea typeface="+mj-ea"/>
+                <a:cs typeface="+mj-cs"/>
+              </a:defRPr>
+            </a:lvl1pPr>
+          </a:lstStyle>
+          <a:p>
+            <a:pPr algn="r"/>
+            <a:r>
+              <a:rPr lang="pt-BR" sz="1935" b="1" dirty="0">
+                <a:solidFill>
+                  <a:schemeClr val="bg1"/>
+                </a:solidFill>
+              </a:rPr>
+              <a:t>Padrões de Projetos </a:t>
+            </a:r>
+            <a:r>
+              <a:rPr lang="pt-BR" sz="1935" b="1" dirty="0" err="1">
+                <a:solidFill>
+                  <a:schemeClr val="bg1"/>
+                </a:solidFill>
+              </a:rPr>
+              <a:t>Criacional</a:t>
+            </a:r>
+            <a:r>
+              <a:rPr lang="pt-BR" sz="1935" b="1" dirty="0">
+                <a:solidFill>
+                  <a:schemeClr val="bg1"/>
+                </a:solidFill>
+              </a:rPr>
+              <a:t> – </a:t>
+            </a:r>
+            <a:r>
+              <a:rPr lang="pt-BR" sz="1935" b="1" dirty="0" err="1">
+                <a:solidFill>
+                  <a:schemeClr val="bg1"/>
+                </a:solidFill>
+              </a:rPr>
+              <a:t>Builder</a:t>
+            </a:r>
+            <a:endParaRPr lang="pt-BR" sz="1935" b="1" dirty="0">
+              <a:solidFill>
+                <a:schemeClr val="bg1"/>
+              </a:solidFill>
+            </a:endParaRPr>
+          </a:p>
+        </p:txBody>
+      </p:sp>
+    </p:spTree>
+    <p:extLst>
+      <p:ext uri="{BB962C8B-B14F-4D97-AF65-F5344CB8AC3E}">
+        <p14:creationId xmlns:p14="http://schemas.microsoft.com/office/powerpoint/2010/main" val="1036373685"/>
+      </p:ext>
+    </p:extLst>
+  </p:cSld>
+  <p:clrMapOvr>
+    <a:masterClrMapping/>
+  </p:clrMapOvr>
+</p:sld>
+</file>
+
+<file path=ppt/slides/slide30.xml><?xml version="1.0" encoding="utf-8"?>
+<p:sld xmlns:a="http://schemas.openxmlformats.org/drawingml/2006/main" xmlns:r="http://schemas.openxmlformats.org/officeDocument/2006/relationships" xmlns:p="http://schemas.openxmlformats.org/presentationml/2006/main">
+  <p:cSld>
+    <p:spTree>
+      <p:nvGrpSpPr>
+        <p:cNvPr id="1" name=""/>
+        <p:cNvGrpSpPr/>
+        <p:nvPr/>
+      </p:nvGrpSpPr>
+      <p:grpSpPr>
+        <a:xfrm>
+          <a:off x="0" y="0"/>
+          <a:ext cx="0" cy="0"/>
+          <a:chOff x="0" y="0"/>
+          <a:chExt cx="0" cy="0"/>
+        </a:xfrm>
+      </p:grpSpPr>
+      <p:sp>
+        <p:nvSpPr>
+          <p:cNvPr id="4" name="Título 3">
+            <a:extLst>
+              <a:ext uri="{FF2B5EF4-FFF2-40B4-BE49-F238E27FC236}">
+                <a16:creationId xmlns:a16="http://schemas.microsoft.com/office/drawing/2014/main" id="{5EA05B02-D80D-3624-D3E0-6EB75542A97B}"/>
+              </a:ext>
+            </a:extLst>
+          </p:cNvPr>
+          <p:cNvSpPr txBox="1">
+            <a:spLocks/>
+          </p:cNvSpPr>
+          <p:nvPr/>
+        </p:nvSpPr>
+        <p:spPr>
+          <a:xfrm>
+            <a:off x="923131" y="242746"/>
+            <a:ext cx="11144250" cy="379413"/>
+          </a:xfrm>
+          <a:prstGeom prst="rect">
+            <a:avLst/>
+          </a:prstGeom>
+          <a:solidFill>
+            <a:srgbClr val="000000"/>
+          </a:solidFill>
+        </p:spPr>
+        <p:txBody>
+          <a:bodyPr vert="horz" lIns="91440" tIns="45720" rIns="91440" bIns="45720" rtlCol="0" anchor="ctr">
+            <a:normAutofit/>
+          </a:bodyPr>
+          <a:lstStyle>
+            <a:lvl1pPr algn="l" defTabSz="914400" rtl="0" eaLnBrk="1" latinLnBrk="0" hangingPunct="1">
+              <a:lnSpc>
+                <a:spcPct val="90000"/>
+              </a:lnSpc>
+              <a:spcBef>
+                <a:spcPct val="0"/>
+              </a:spcBef>
+              <a:buNone/>
+              <a:defRPr sz="4400" kern="1200">
+                <a:solidFill>
+                  <a:schemeClr val="tx1"/>
+                </a:solidFill>
+                <a:latin typeface="+mj-lt"/>
+                <a:ea typeface="+mj-ea"/>
+                <a:cs typeface="+mj-cs"/>
+              </a:defRPr>
+            </a:lvl1pPr>
+          </a:lstStyle>
+          <a:p>
+            <a:pPr algn="r"/>
+            <a:r>
+              <a:rPr lang="pt-BR" sz="1935" b="1" dirty="0">
+                <a:solidFill>
+                  <a:schemeClr val="bg1"/>
+                </a:solidFill>
+              </a:rPr>
+              <a:t>Padrões de Projetos </a:t>
+            </a:r>
+            <a:r>
+              <a:rPr lang="pt-BR" sz="1935" b="1" dirty="0" err="1">
+                <a:solidFill>
+                  <a:schemeClr val="bg1"/>
+                </a:solidFill>
+              </a:rPr>
+              <a:t>Criacional</a:t>
+            </a:r>
+            <a:r>
+              <a:rPr lang="pt-BR" sz="1935" b="1" dirty="0">
+                <a:solidFill>
+                  <a:schemeClr val="bg1"/>
+                </a:solidFill>
+              </a:rPr>
+              <a:t> – </a:t>
+            </a:r>
+            <a:r>
+              <a:rPr lang="pt-BR" sz="1935" b="1" dirty="0" err="1">
+                <a:solidFill>
+                  <a:schemeClr val="bg1"/>
+                </a:solidFill>
+              </a:rPr>
+              <a:t>Builder</a:t>
+            </a:r>
+            <a:endParaRPr lang="pt-BR" sz="1935" b="1" dirty="0">
+              <a:solidFill>
+                <a:schemeClr val="bg1"/>
+              </a:solidFill>
+            </a:endParaRPr>
+          </a:p>
+        </p:txBody>
+      </p:sp>
+      <p:sp>
+        <p:nvSpPr>
+          <p:cNvPr id="2" name="CaixaDeTexto 1">
+            <a:extLst>
+              <a:ext uri="{FF2B5EF4-FFF2-40B4-BE49-F238E27FC236}">
+                <a16:creationId xmlns:a16="http://schemas.microsoft.com/office/drawing/2014/main" id="{833D04CD-11B8-55DE-B219-63E10E011332}"/>
+              </a:ext>
+            </a:extLst>
+          </p:cNvPr>
+          <p:cNvSpPr txBox="1"/>
+          <p:nvPr/>
+        </p:nvSpPr>
+        <p:spPr>
+          <a:xfrm>
+            <a:off x="923131" y="232627"/>
+            <a:ext cx="4909714" cy="369332"/>
+          </a:xfrm>
+          <a:prstGeom prst="rect">
+            <a:avLst/>
+          </a:prstGeom>
+          <a:noFill/>
+        </p:spPr>
+        <p:txBody>
+          <a:bodyPr wrap="square" rtlCol="0">
+            <a:spAutoFit/>
+          </a:bodyPr>
+          <a:lstStyle/>
+          <a:p>
+            <a:r>
+              <a:rPr lang="pt-BR" b="1" dirty="0">
+                <a:solidFill>
+                  <a:schemeClr val="bg1"/>
+                </a:solidFill>
+              </a:rPr>
+              <a:t>Implementação C# - Solução </a:t>
+            </a:r>
+          </a:p>
+        </p:txBody>
+      </p:sp>
+      <p:pic>
+        <p:nvPicPr>
+          <p:cNvPr id="3" name="Imagem 2">
+            <a:extLst>
+              <a:ext uri="{FF2B5EF4-FFF2-40B4-BE49-F238E27FC236}">
+                <a16:creationId xmlns:a16="http://schemas.microsoft.com/office/drawing/2014/main" id="{C83DD5EB-9337-89D4-021C-3BABCBA14A44}"/>
+              </a:ext>
+            </a:extLst>
+          </p:cNvPr>
+          <p:cNvPicPr>
+            <a:picLocks noChangeAspect="1"/>
+          </p:cNvPicPr>
+          <p:nvPr/>
+        </p:nvPicPr>
+        <p:blipFill>
+          <a:blip r:embed="rId2"/>
+          <a:stretch>
+            <a:fillRect/>
+          </a:stretch>
+        </p:blipFill>
+        <p:spPr>
+          <a:xfrm>
+            <a:off x="6010765" y="1233181"/>
+            <a:ext cx="6056616" cy="4072552"/>
+          </a:xfrm>
+          <a:prstGeom prst="rect">
+            <a:avLst/>
+          </a:prstGeom>
+        </p:spPr>
+      </p:pic>
+      <p:pic>
+        <p:nvPicPr>
+          <p:cNvPr id="5" name="Imagem 4">
+            <a:extLst>
+              <a:ext uri="{FF2B5EF4-FFF2-40B4-BE49-F238E27FC236}">
+                <a16:creationId xmlns:a16="http://schemas.microsoft.com/office/drawing/2014/main" id="{B72CD288-74A7-0C34-5290-4E9B03502B2A}"/>
+              </a:ext>
+            </a:extLst>
+          </p:cNvPr>
+          <p:cNvPicPr>
+            <a:picLocks noChangeAspect="1"/>
+          </p:cNvPicPr>
+          <p:nvPr/>
+        </p:nvPicPr>
+        <p:blipFill>
+          <a:blip r:embed="rId3"/>
+          <a:stretch>
+            <a:fillRect/>
+          </a:stretch>
+        </p:blipFill>
+        <p:spPr>
+          <a:xfrm>
+            <a:off x="422479" y="1233181"/>
+            <a:ext cx="5324743" cy="3805747"/>
+          </a:xfrm>
+          <a:prstGeom prst="rect">
+            <a:avLst/>
+          </a:prstGeom>
+        </p:spPr>
+      </p:pic>
+      <p:sp>
+        <p:nvSpPr>
+          <p:cNvPr id="7" name="CaixaDeTexto 6">
+            <a:extLst>
+              <a:ext uri="{FF2B5EF4-FFF2-40B4-BE49-F238E27FC236}">
+                <a16:creationId xmlns:a16="http://schemas.microsoft.com/office/drawing/2014/main" id="{AA1A203D-80AE-82CA-0952-411B87C07198}"/>
+              </a:ext>
+            </a:extLst>
+          </p:cNvPr>
+          <p:cNvSpPr txBox="1"/>
+          <p:nvPr/>
+        </p:nvSpPr>
+        <p:spPr>
+          <a:xfrm>
+            <a:off x="422479" y="5624819"/>
+            <a:ext cx="11542143" cy="923330"/>
+          </a:xfrm>
+          <a:prstGeom prst="rect">
+            <a:avLst/>
+          </a:prstGeom>
+          <a:solidFill>
+            <a:schemeClr val="tx1"/>
+          </a:solidFill>
+        </p:spPr>
+        <p:txBody>
+          <a:bodyPr wrap="square" rtlCol="0">
+            <a:spAutoFit/>
+          </a:bodyPr>
+          <a:lstStyle/>
+          <a:p>
+            <a:pPr algn="ctr"/>
+            <a:r>
+              <a:rPr lang="pt-BR" b="1" dirty="0">
+                <a:solidFill>
+                  <a:schemeClr val="bg1"/>
+                </a:solidFill>
+              </a:rPr>
+              <a:t>É importante dizer que </a:t>
+            </a:r>
+            <a:r>
+              <a:rPr lang="pt-BR" b="1" dirty="0" err="1">
+                <a:solidFill>
+                  <a:schemeClr val="bg1"/>
+                </a:solidFill>
+              </a:rPr>
+              <a:t>Builders</a:t>
+            </a:r>
+            <a:r>
+              <a:rPr lang="pt-BR" b="1" dirty="0">
+                <a:solidFill>
+                  <a:schemeClr val="bg1"/>
+                </a:solidFill>
+              </a:rPr>
+              <a:t> distintos não necessariamente precisam criar objetos de uma mesma classe mudando apenas seus atributos. Eles podem criar objetos de classes diferentes e tais classes nem precisam pertencer a mesma hierarquia de classes. O único requisito é que o processo de criação seja o mesmo.</a:t>
+            </a:r>
+          </a:p>
+        </p:txBody>
+      </p:sp>
+      <p:sp>
+        <p:nvSpPr>
+          <p:cNvPr id="8" name="CaixaDeTexto 7">
+            <a:extLst>
+              <a:ext uri="{FF2B5EF4-FFF2-40B4-BE49-F238E27FC236}">
+                <a16:creationId xmlns:a16="http://schemas.microsoft.com/office/drawing/2014/main" id="{D2FA29D8-10E7-0AB3-704A-680F273C3667}"/>
+              </a:ext>
+            </a:extLst>
+          </p:cNvPr>
+          <p:cNvSpPr txBox="1"/>
+          <p:nvPr/>
+        </p:nvSpPr>
+        <p:spPr>
+          <a:xfrm>
+            <a:off x="7795404" y="743004"/>
+            <a:ext cx="2957209" cy="369332"/>
+          </a:xfrm>
+          <a:prstGeom prst="rect">
+            <a:avLst/>
+          </a:prstGeom>
+          <a:noFill/>
+        </p:spPr>
+        <p:txBody>
+          <a:bodyPr wrap="square" rtlCol="0">
+            <a:spAutoFit/>
+          </a:bodyPr>
+          <a:lstStyle/>
+          <a:p>
+            <a:r>
+              <a:rPr lang="pt-BR" dirty="0"/>
+              <a:t>Modelo Aplicado do </a:t>
+            </a:r>
+            <a:r>
+              <a:rPr lang="pt-BR" dirty="0" err="1"/>
+              <a:t>Builder</a:t>
+            </a:r>
+            <a:endParaRPr lang="pt-BR" dirty="0"/>
+          </a:p>
+        </p:txBody>
+      </p:sp>
+      <p:sp>
+        <p:nvSpPr>
+          <p:cNvPr id="6" name="CaixaDeTexto 5">
+            <a:extLst>
+              <a:ext uri="{FF2B5EF4-FFF2-40B4-BE49-F238E27FC236}">
+                <a16:creationId xmlns:a16="http://schemas.microsoft.com/office/drawing/2014/main" id="{F4B3FFE5-6B30-B0B2-CC8C-6B35E7A55EC2}"/>
+              </a:ext>
+            </a:extLst>
+          </p:cNvPr>
+          <p:cNvSpPr txBox="1"/>
+          <p:nvPr/>
+        </p:nvSpPr>
+        <p:spPr>
+          <a:xfrm>
+            <a:off x="1899383" y="715255"/>
+            <a:ext cx="2957209" cy="369332"/>
+          </a:xfrm>
+          <a:prstGeom prst="rect">
+            <a:avLst/>
+          </a:prstGeom>
+          <a:noFill/>
+        </p:spPr>
+        <p:txBody>
+          <a:bodyPr wrap="square" rtlCol="0">
+            <a:spAutoFit/>
+          </a:bodyPr>
+          <a:lstStyle/>
+          <a:p>
+            <a:r>
+              <a:rPr lang="pt-BR" dirty="0"/>
+              <a:t>Modelo Genérico do </a:t>
+            </a:r>
+            <a:r>
+              <a:rPr lang="pt-BR" dirty="0" err="1"/>
+              <a:t>Builder</a:t>
+            </a:r>
+            <a:endParaRPr lang="pt-BR" dirty="0"/>
+          </a:p>
+        </p:txBody>
+      </p:sp>
+    </p:spTree>
+    <p:extLst>
+      <p:ext uri="{BB962C8B-B14F-4D97-AF65-F5344CB8AC3E}">
+        <p14:creationId xmlns:p14="http://schemas.microsoft.com/office/powerpoint/2010/main" val="4100475490"/>
+      </p:ext>
+    </p:extLst>
+  </p:cSld>
+  <p:clrMapOvr>
+    <a:masterClrMapping/>
+  </p:clrMapOvr>
+</p:sld>
+</file>
+
+<file path=ppt/slides/slide31.xml><?xml version="1.0" encoding="utf-8"?>
 <p:sld xmlns:a="http://schemas.openxmlformats.org/drawingml/2006/main" xmlns:r="http://schemas.openxmlformats.org/officeDocument/2006/relationships" xmlns:p="http://schemas.openxmlformats.org/presentationml/2006/main">
   <p:cSld>
     <p:spTree>
@@ -27418,7 +28750,7 @@
 </p:sld>
 </file>
 
-<file path=ppt/slides/slide29.xml><?xml version="1.0" encoding="utf-8"?>
+<file path=ppt/slides/slide32.xml><?xml version="1.0" encoding="utf-8"?>
 <p:sld xmlns:a="http://schemas.openxmlformats.org/drawingml/2006/main" xmlns:r="http://schemas.openxmlformats.org/officeDocument/2006/relationships" xmlns:p="http://schemas.openxmlformats.org/presentationml/2006/main">
   <p:cSld>
     <p:spTree>
@@ -28043,184 +29375,7 @@
 </p:sld>
 </file>
 
-<file path=ppt/slides/slide3.xml><?xml version="1.0" encoding="utf-8"?>
-<p:sld xmlns:a="http://schemas.openxmlformats.org/drawingml/2006/main" xmlns:r="http://schemas.openxmlformats.org/officeDocument/2006/relationships" xmlns:p="http://schemas.openxmlformats.org/presentationml/2006/main">
-  <p:cSld>
-    <p:spTree>
-      <p:nvGrpSpPr>
-        <p:cNvPr id="1" name=""/>
-        <p:cNvGrpSpPr/>
-        <p:nvPr/>
-      </p:nvGrpSpPr>
-      <p:grpSpPr>
-        <a:xfrm>
-          <a:off x="0" y="0"/>
-          <a:ext cx="0" cy="0"/>
-          <a:chOff x="0" y="0"/>
-          <a:chExt cx="0" cy="0"/>
-        </a:xfrm>
-      </p:grpSpPr>
-      <p:sp>
-        <p:nvSpPr>
-          <p:cNvPr id="3" name="Espaço Reservado para Conteúdo 2">
-            <a:extLst>
-              <a:ext uri="{FF2B5EF4-FFF2-40B4-BE49-F238E27FC236}">
-                <a16:creationId xmlns:a16="http://schemas.microsoft.com/office/drawing/2014/main" id="{212081E4-07F6-C689-2ACC-B6CADD634983}"/>
-              </a:ext>
-            </a:extLst>
-          </p:cNvPr>
-          <p:cNvSpPr>
-            <a:spLocks noGrp="1"/>
-          </p:cNvSpPr>
-          <p:nvPr>
-            <p:ph idx="1"/>
-          </p:nvPr>
-        </p:nvSpPr>
-        <p:spPr>
-          <a:xfrm>
-            <a:off x="838199" y="809469"/>
-            <a:ext cx="11229181" cy="5367494"/>
-          </a:xfrm>
-        </p:spPr>
-        <p:txBody>
-          <a:bodyPr>
-            <a:normAutofit/>
-          </a:bodyPr>
-          <a:lstStyle/>
-          <a:p>
-            <a:pPr marL="0" indent="0" algn="ctr">
-              <a:buNone/>
-            </a:pPr>
-            <a:r>
-              <a:rPr lang="pt-BR" b="1" dirty="0"/>
-              <a:t>Aplicabilidade (Quando utilizar?)</a:t>
-            </a:r>
-          </a:p>
-          <a:p>
-            <a:pPr algn="l"/>
-            <a:r>
-              <a:rPr lang="pt-BR" sz="3200" dirty="0"/>
-              <a:t>Quando um algoritmo que cria um objeto complexo deve ser independente das partes que o compõem e de como tais partes são montadas.</a:t>
-            </a:r>
-          </a:p>
-          <a:p>
-            <a:pPr algn="l"/>
-            <a:endParaRPr lang="pt-BR" sz="3200" dirty="0"/>
-          </a:p>
-          <a:p>
-            <a:pPr algn="l"/>
-            <a:r>
-              <a:rPr lang="pt-BR" sz="3200" dirty="0"/>
-              <a:t>Quando o processo de construção deve permitir representações diferentes para o objeto que é construído.</a:t>
-            </a:r>
-          </a:p>
-        </p:txBody>
-      </p:sp>
-      <p:sp>
-        <p:nvSpPr>
-          <p:cNvPr id="4" name="Título 3">
-            <a:extLst>
-              <a:ext uri="{FF2B5EF4-FFF2-40B4-BE49-F238E27FC236}">
-                <a16:creationId xmlns:a16="http://schemas.microsoft.com/office/drawing/2014/main" id="{5EA05B02-D80D-3624-D3E0-6EB75542A97B}"/>
-              </a:ext>
-            </a:extLst>
-          </p:cNvPr>
-          <p:cNvSpPr txBox="1">
-            <a:spLocks/>
-          </p:cNvSpPr>
-          <p:nvPr/>
-        </p:nvSpPr>
-        <p:spPr>
-          <a:xfrm>
-            <a:off x="923131" y="242746"/>
-            <a:ext cx="11144250" cy="379413"/>
-          </a:xfrm>
-          <a:prstGeom prst="rect">
-            <a:avLst/>
-          </a:prstGeom>
-          <a:solidFill>
-            <a:srgbClr val="000000"/>
-          </a:solidFill>
-        </p:spPr>
-        <p:txBody>
-          <a:bodyPr vert="horz" lIns="91440" tIns="45720" rIns="91440" bIns="45720" rtlCol="0" anchor="ctr">
-            <a:normAutofit/>
-          </a:bodyPr>
-          <a:lstStyle>
-            <a:lvl1pPr algn="l" defTabSz="914400" rtl="0" eaLnBrk="1" latinLnBrk="0" hangingPunct="1">
-              <a:lnSpc>
-                <a:spcPct val="90000"/>
-              </a:lnSpc>
-              <a:spcBef>
-                <a:spcPct val="0"/>
-              </a:spcBef>
-              <a:buNone/>
-              <a:defRPr sz="4400" kern="1200">
-                <a:solidFill>
-                  <a:schemeClr val="tx1"/>
-                </a:solidFill>
-                <a:latin typeface="+mj-lt"/>
-                <a:ea typeface="+mj-ea"/>
-                <a:cs typeface="+mj-cs"/>
-              </a:defRPr>
-            </a:lvl1pPr>
-          </a:lstStyle>
-          <a:p>
-            <a:pPr algn="r"/>
-            <a:r>
-              <a:rPr lang="pt-BR" sz="1935" b="1" dirty="0">
-                <a:solidFill>
-                  <a:schemeClr val="bg1"/>
-                </a:solidFill>
-              </a:rPr>
-              <a:t>Padrões de Projetos </a:t>
-            </a:r>
-            <a:r>
-              <a:rPr lang="pt-BR" sz="1935" b="1" dirty="0" err="1">
-                <a:solidFill>
-                  <a:schemeClr val="bg1"/>
-                </a:solidFill>
-              </a:rPr>
-              <a:t>Criacional</a:t>
-            </a:r>
-            <a:r>
-              <a:rPr lang="pt-BR" sz="1935" b="1" dirty="0">
-                <a:solidFill>
-                  <a:schemeClr val="bg1"/>
-                </a:solidFill>
-              </a:rPr>
-              <a:t> – </a:t>
-            </a:r>
-            <a:r>
-              <a:rPr lang="pt-BR" sz="1935" b="1" dirty="0" err="1">
-                <a:solidFill>
-                  <a:schemeClr val="bg1"/>
-                </a:solidFill>
-              </a:rPr>
-              <a:t>Builder</a:t>
-            </a:r>
-            <a:endParaRPr lang="pt-BR" sz="1935" b="1" dirty="0">
-              <a:solidFill>
-                <a:schemeClr val="bg1"/>
-              </a:solidFill>
-            </a:endParaRPr>
-          </a:p>
-        </p:txBody>
-      </p:sp>
-    </p:spTree>
-    <p:extLst>
-      <p:ext uri="{BB962C8B-B14F-4D97-AF65-F5344CB8AC3E}">
-        <p14:creationId xmlns:p14="http://schemas.microsoft.com/office/powerpoint/2010/main" val="1036373685"/>
-      </p:ext>
-    </p:extLst>
-  </p:cSld>
-  <p:clrMapOvr>
-    <a:masterClrMapping/>
-  </p:clrMapOvr>
-</p:sld>
-</file>
-
-<file path=ppt/slides/slide30.xml><?xml version="1.0" encoding="utf-8"?>
+<file path=ppt/slides/slide33.xml><?xml version="1.0" encoding="utf-8"?>
 <p:sld xmlns:a="http://schemas.openxmlformats.org/drawingml/2006/main" xmlns:r="http://schemas.openxmlformats.org/officeDocument/2006/relationships" xmlns:p="http://schemas.openxmlformats.org/presentationml/2006/main">
   <p:cSld>
     <p:bg>
@@ -28940,7 +30095,7 @@
 </p:sld>
 </file>
 
-<file path=ppt/slides/slide31.xml><?xml version="1.0" encoding="utf-8"?>
+<file path=ppt/slides/slide34.xml><?xml version="1.0" encoding="utf-8"?>
 <p:sld xmlns:a="http://schemas.openxmlformats.org/drawingml/2006/main" xmlns:r="http://schemas.openxmlformats.org/officeDocument/2006/relationships" xmlns:p="http://schemas.openxmlformats.org/presentationml/2006/main">
   <p:cSld>
     <p:bg>
@@ -29657,7 +30812,7 @@
 </p:sld>
 </file>
 
-<file path=ppt/slides/slide32.xml><?xml version="1.0" encoding="utf-8"?>
+<file path=ppt/slides/slide35.xml><?xml version="1.0" encoding="utf-8"?>
 <p:sld xmlns:a="http://schemas.openxmlformats.org/drawingml/2006/main" xmlns:r="http://schemas.openxmlformats.org/officeDocument/2006/relationships" xmlns:p="http://schemas.openxmlformats.org/presentationml/2006/main">
   <p:cSld>
     <p:spTree>
@@ -29902,7 +31057,7 @@
 </p:sld>
 </file>
 
-<file path=ppt/slides/slide33.xml><?xml version="1.0" encoding="utf-8"?>
+<file path=ppt/slides/slide36.xml><?xml version="1.0" encoding="utf-8"?>
 <p:sld xmlns:a="http://schemas.openxmlformats.org/drawingml/2006/main" xmlns:r="http://schemas.openxmlformats.org/officeDocument/2006/relationships" xmlns:p="http://schemas.openxmlformats.org/presentationml/2006/main">
   <p:cSld>
     <p:spTree>
@@ -30150,7 +31305,7 @@
 </p:sld>
 </file>
 
-<file path=ppt/slides/slide34.xml><?xml version="1.0" encoding="utf-8"?>
+<file path=ppt/slides/slide37.xml><?xml version="1.0" encoding="utf-8"?>
 <p:sld xmlns:a="http://schemas.openxmlformats.org/drawingml/2006/main" xmlns:r="http://schemas.openxmlformats.org/officeDocument/2006/relationships" xmlns:p="http://schemas.openxmlformats.org/presentationml/2006/main">
   <p:cSld>
     <p:spTree>

</xml_diff>